<commit_message>
Kleinere Korrekturen an Dokumentation und Präsentation
</commit_message>
<xml_diff>
--- a/Abgabe/PortfolioZusammenstellungSMI_Blaser_Gruetter.pptx
+++ b/Abgabe/PortfolioZusammenstellungSMI_Blaser_Gruetter.pptx
@@ -5300,10 +5300,10 @@
       </p:sp>
       <p:pic>
         <p:nvPicPr>
-          <p:cNvPr id="4" name="Grafik 3">
+          <p:cNvPr id="6" name="Grafik 5">
             <a:extLst>
               <a:ext uri="{FF2B5EF4-FFF2-40B4-BE49-F238E27FC236}">
-                <a16:creationId xmlns:a16="http://schemas.microsoft.com/office/drawing/2014/main" id="{C92936D5-BE91-4099-B031-903EF2E71686}"/>
+                <a16:creationId xmlns:a16="http://schemas.microsoft.com/office/drawing/2014/main" id="{CACFCD61-7DA3-4DFB-BE51-481A9D96F4A2}"/>
               </a:ext>
             </a:extLst>
           </p:cNvPr>
@@ -5320,8 +5320,8 @@
         </p:blipFill>
         <p:spPr>
           <a:xfrm>
-            <a:off x="545167" y="3021652"/>
-            <a:ext cx="11101663" cy="1995990"/>
+            <a:off x="581192" y="2855095"/>
+            <a:ext cx="11029614" cy="2007028"/>
           </a:xfrm>
           <a:prstGeom prst="rect">
             <a:avLst/>
@@ -5435,8 +5435,8 @@
         </p:blipFill>
         <p:spPr>
           <a:xfrm>
-            <a:off x="3216274" y="2377537"/>
-            <a:ext cx="5759450" cy="3284220"/>
+            <a:off x="2399169" y="2046746"/>
+            <a:ext cx="7306146" cy="4354054"/>
           </a:xfrm>
           <a:prstGeom prst="rect">
             <a:avLst/>
@@ -5503,21 +5503,42 @@
           </a:p>
         </p:txBody>
       </p:sp>
-      <p:pic>
-        <p:nvPicPr>
-          <p:cNvPr id="4" name="Inhaltsplatzhalter 3">
+      <p:sp>
+        <p:nvSpPr>
+          <p:cNvPr id="8" name="Inhaltsplatzhalter 7">
             <a:extLst>
               <a:ext uri="{FF2B5EF4-FFF2-40B4-BE49-F238E27FC236}">
-                <a16:creationId xmlns:a16="http://schemas.microsoft.com/office/drawing/2014/main" id="{1F76E2D5-43AD-49F4-AA7C-BD7881C39C99}"/>
+                <a16:creationId xmlns:a16="http://schemas.microsoft.com/office/drawing/2014/main" id="{64FE76D3-DC72-4217-9FE3-FF9C39DF9A3A}"/>
               </a:ext>
             </a:extLst>
           </p:cNvPr>
-          <p:cNvPicPr>
-            <a:picLocks noGrp="1" noChangeAspect="1"/>
-          </p:cNvPicPr>
+          <p:cNvSpPr>
+            <a:spLocks noGrp="1"/>
+          </p:cNvSpPr>
           <p:nvPr>
             <p:ph idx="1"/>
           </p:nvPr>
+        </p:nvSpPr>
+        <p:spPr/>
+        <p:txBody>
+          <a:bodyPr/>
+          <a:lstStyle/>
+          <a:p>
+            <a:endParaRPr lang="de-CH" dirty="0"/>
+          </a:p>
+        </p:txBody>
+      </p:sp>
+      <p:pic>
+        <p:nvPicPr>
+          <p:cNvPr id="9" name="Grafik 8">
+            <a:extLst>
+              <a:ext uri="{FF2B5EF4-FFF2-40B4-BE49-F238E27FC236}">
+                <a16:creationId xmlns:a16="http://schemas.microsoft.com/office/drawing/2014/main" id="{4D281BE7-6016-4A8B-B9CC-208F92125AAC}"/>
+              </a:ext>
+            </a:extLst>
+          </p:cNvPr>
+          <p:cNvPicPr/>
+          <p:nvPr/>
         </p:nvPicPr>
         <p:blipFill>
           <a:blip r:embed="rId3"/>
@@ -5527,8 +5548,8 @@
         </p:blipFill>
         <p:spPr>
           <a:xfrm>
-            <a:off x="2631309" y="2190279"/>
-            <a:ext cx="6929382" cy="4482178"/>
+            <a:off x="2727388" y="2011897"/>
+            <a:ext cx="7122782" cy="4651453"/>
           </a:xfrm>
           <a:prstGeom prst="rect">
             <a:avLst/>

</xml_diff>